<commit_message>
upd test occ ppt R
</commit_message>
<xml_diff>
--- a/Tesi Emanuele Orfanelli 1383726.pptx
+++ b/Tesi Emanuele Orfanelli 1383726.pptx
@@ -5,10 +5,10 @@
     <p:sldMasterId id="2147483648" r:id="rId1"/>
   </p:sldMasterIdLst>
   <p:notesMasterIdLst>
-    <p:notesMasterId r:id="rId27"/>
+    <p:notesMasterId r:id="rId29"/>
   </p:notesMasterIdLst>
   <p:handoutMasterIdLst>
-    <p:handoutMasterId r:id="rId28"/>
+    <p:handoutMasterId r:id="rId30"/>
   </p:handoutMasterIdLst>
   <p:sldIdLst>
     <p:sldId id="263" r:id="rId2"/>
@@ -31,11 +31,13 @@
     <p:sldId id="306" r:id="rId19"/>
     <p:sldId id="304" r:id="rId20"/>
     <p:sldId id="305" r:id="rId21"/>
-    <p:sldId id="296" r:id="rId22"/>
-    <p:sldId id="297" r:id="rId23"/>
-    <p:sldId id="298" r:id="rId24"/>
-    <p:sldId id="311" r:id="rId25"/>
-    <p:sldId id="310" r:id="rId26"/>
+    <p:sldId id="314" r:id="rId22"/>
+    <p:sldId id="313" r:id="rId23"/>
+    <p:sldId id="296" r:id="rId24"/>
+    <p:sldId id="297" r:id="rId25"/>
+    <p:sldId id="298" r:id="rId26"/>
+    <p:sldId id="311" r:id="rId27"/>
+    <p:sldId id="310" r:id="rId28"/>
   </p:sldIdLst>
   <p:sldSz cx="9144000" cy="6858000" type="screen4x3"/>
   <p:notesSz cx="6858000" cy="9144000"/>
@@ -2972,11 +2974,7 @@
           <a:p>
             <a:r>
               <a:rPr lang="en-US" baseline="0" dirty="0" smtClean="0"/>
-              <a:t>How </a:t>
-            </a:r>
-            <a:r>
-              <a:rPr lang="en-US" baseline="0" dirty="0" smtClean="0"/>
-              <a:t>many </a:t>
+              <a:t>How many </a:t>
             </a:r>
             <a:r>
               <a:rPr lang="en-US" baseline="0" dirty="0" err="1" smtClean="0"/>
@@ -2984,11 +2982,7 @@
             </a:r>
             <a:r>
               <a:rPr lang="en-US" baseline="0" dirty="0" smtClean="0"/>
-              <a:t> in the train set? How many in the test set</a:t>
-            </a:r>
-            <a:r>
-              <a:rPr lang="en-US" baseline="0" dirty="0" smtClean="0"/>
-              <a:t>?</a:t>
+              <a:t> in the train set? How many in the test set?</a:t>
             </a:r>
           </a:p>
           <a:p>
@@ -3543,7 +3537,21 @@
             </a:r>
             <a:r>
               <a:rPr lang="en-US" dirty="0" smtClean="0"/>
-              <a:t> AU?</a:t>
+              <a:t> AU</a:t>
+            </a:r>
+            <a:r>
+              <a:rPr lang="en-US" dirty="0" smtClean="0"/>
+              <a:t>?</a:t>
+            </a:r>
+          </a:p>
+          <a:p>
+            <a:r>
+              <a:rPr lang="en-US" dirty="0" err="1" smtClean="0"/>
+              <a:t>Altra</a:t>
+            </a:r>
+            <a:r>
+              <a:rPr lang="en-US" baseline="0" dirty="0" smtClean="0"/>
+              <a:t> con diff test?</a:t>
             </a:r>
             <a:endParaRPr lang="en-US" dirty="0"/>
           </a:p>
@@ -3637,11 +3645,22 @@
           <a:p>
             <a:r>
               <a:rPr lang="en-US" dirty="0" smtClean="0"/>
-              <a:t>Don’t have</a:t>
-            </a:r>
-            <a:r>
-              <a:rPr lang="en-US" baseline="0" dirty="0" smtClean="0"/>
-              <a:t> much to say about this</a:t>
+              <a:t>PUT </a:t>
+            </a:r>
+            <a:r>
+              <a:rPr lang="en-US" dirty="0" err="1" smtClean="0"/>
+              <a:t>Aus</a:t>
+            </a:r>
+            <a:endParaRPr lang="en-US" dirty="0" smtClean="0"/>
+          </a:p>
+          <a:p>
+            <a:r>
+              <a:rPr lang="en-US" dirty="0" smtClean="0"/>
+              <a:t>Keep it or </a:t>
+            </a:r>
+            <a:r>
+              <a:rPr lang="en-US" smtClean="0"/>
+              <a:t>just train?</a:t>
             </a:r>
             <a:endParaRPr lang="en-US" dirty="0"/>
           </a:p>
@@ -3679,7 +3698,7 @@
     </p:spTree>
     <p:extLst>
       <p:ext uri="{BB962C8B-B14F-4D97-AF65-F5344CB8AC3E}">
-        <p14:creationId xmlns:p14="http://schemas.microsoft.com/office/powerpoint/2010/main" val="3241693039"/>
+        <p14:creationId xmlns:p14="http://schemas.microsoft.com/office/powerpoint/2010/main" val="867656258"/>
       </p:ext>
     </p:extLst>
   </p:cSld>
@@ -3735,7 +3754,29 @@
           <a:p>
             <a:r>
               <a:rPr lang="en-US" dirty="0" smtClean="0"/>
-              <a:t>Add confusion matrix?</a:t>
+              <a:t>Nomi </a:t>
+            </a:r>
+            <a:r>
+              <a:rPr lang="en-US" dirty="0" err="1" smtClean="0"/>
+              <a:t>delle</a:t>
+            </a:r>
+            <a:r>
+              <a:rPr lang="en-US" dirty="0" smtClean="0"/>
+              <a:t> AU</a:t>
+            </a:r>
+            <a:r>
+              <a:rPr lang="en-US" dirty="0" smtClean="0"/>
+              <a:t>?</a:t>
+            </a:r>
+          </a:p>
+          <a:p>
+            <a:r>
+              <a:rPr lang="en-US" dirty="0" err="1" smtClean="0"/>
+              <a:t>Altra</a:t>
+            </a:r>
+            <a:r>
+              <a:rPr lang="en-US" baseline="0" dirty="0" smtClean="0"/>
+              <a:t> con diff test?</a:t>
             </a:r>
             <a:endParaRPr lang="en-US" dirty="0"/>
           </a:p>
@@ -3773,7 +3814,7 @@
     </p:spTree>
     <p:extLst>
       <p:ext uri="{BB962C8B-B14F-4D97-AF65-F5344CB8AC3E}">
-        <p14:creationId xmlns:p14="http://schemas.microsoft.com/office/powerpoint/2010/main" val="1832073229"/>
+        <p14:creationId xmlns:p14="http://schemas.microsoft.com/office/powerpoint/2010/main" val="1498419378"/>
       </p:ext>
     </p:extLst>
   </p:cSld>
@@ -3827,6 +3868,58 @@
           <a:bodyPr/>
           <a:lstStyle/>
           <a:p>
+            <a:r>
+              <a:rPr lang="en-US" dirty="0" smtClean="0"/>
+              <a:t>Don’t have</a:t>
+            </a:r>
+            <a:r>
+              <a:rPr lang="en-US" baseline="0" dirty="0" smtClean="0"/>
+              <a:t> much to say about </a:t>
+            </a:r>
+            <a:r>
+              <a:rPr lang="en-US" baseline="0" dirty="0" smtClean="0"/>
+              <a:t>this</a:t>
+            </a:r>
+          </a:p>
+          <a:p>
+            <a:r>
+              <a:rPr lang="en-US" baseline="0" dirty="0" smtClean="0"/>
+              <a:t>Dire 58%?</a:t>
+            </a:r>
+          </a:p>
+          <a:p>
+            <a:r>
+              <a:rPr lang="en-US" baseline="0" dirty="0" err="1" smtClean="0"/>
+              <a:t>Elenco</a:t>
+            </a:r>
+            <a:r>
+              <a:rPr lang="en-US" baseline="0" dirty="0" smtClean="0"/>
+              <a:t> </a:t>
+            </a:r>
+            <a:r>
+              <a:rPr lang="en-US" baseline="0" dirty="0" err="1" smtClean="0"/>
+              <a:t>var</a:t>
+            </a:r>
+            <a:r>
+              <a:rPr lang="en-US" baseline="0" dirty="0" smtClean="0"/>
+              <a:t> </a:t>
+            </a:r>
+            <a:r>
+              <a:rPr lang="en-US" baseline="0" dirty="0" err="1" smtClean="0"/>
+              <a:t>tipo</a:t>
+            </a:r>
+            <a:r>
+              <a:rPr lang="en-US" baseline="0" dirty="0" smtClean="0"/>
+              <a:t> slide </a:t>
+            </a:r>
+            <a:r>
+              <a:rPr lang="en-US" baseline="0" dirty="0" err="1" smtClean="0"/>
+              <a:t>sopra</a:t>
+            </a:r>
+            <a:r>
+              <a:rPr lang="en-US" baseline="0" dirty="0" smtClean="0"/>
+              <a:t>?</a:t>
+            </a:r>
             <a:endParaRPr lang="en-US" dirty="0"/>
           </a:p>
         </p:txBody>
@@ -3854,7 +3947,240 @@
               <a:pPr>
                 <a:defRPr/>
               </a:pPr>
-              <a:t>25</a:t>
+              <a:t>23</a:t>
+            </a:fld>
+            <a:endParaRPr lang="it-IT" altLang="it-IT"/>
+          </a:p>
+        </p:txBody>
+      </p:sp>
+    </p:spTree>
+    <p:extLst>
+      <p:ext uri="{BB962C8B-B14F-4D97-AF65-F5344CB8AC3E}">
+        <p14:creationId xmlns:p14="http://schemas.microsoft.com/office/powerpoint/2010/main" val="3241693039"/>
+      </p:ext>
+    </p:extLst>
+  </p:cSld>
+  <p:clrMapOvr>
+    <a:masterClrMapping/>
+  </p:clrMapOvr>
+</p:notes>
+</file>
+
+<file path=ppt/notesSlides/notesSlide24.xml><?xml version="1.0" encoding="utf-8"?>
+<p:notes xmlns:a="http://schemas.openxmlformats.org/drawingml/2006/main" xmlns:r="http://schemas.openxmlformats.org/officeDocument/2006/relationships" xmlns:p="http://schemas.openxmlformats.org/presentationml/2006/main">
+  <p:cSld>
+    <p:spTree>
+      <p:nvGrpSpPr>
+        <p:cNvPr id="1" name=""/>
+        <p:cNvGrpSpPr/>
+        <p:nvPr/>
+      </p:nvGrpSpPr>
+      <p:grpSpPr>
+        <a:xfrm>
+          <a:off x="0" y="0"/>
+          <a:ext cx="0" cy="0"/>
+          <a:chOff x="0" y="0"/>
+          <a:chExt cx="0" cy="0"/>
+        </a:xfrm>
+      </p:grpSpPr>
+      <p:sp>
+        <p:nvSpPr>
+          <p:cNvPr id="2" name="Slide Image Placeholder 1"/>
+          <p:cNvSpPr>
+            <a:spLocks noGrp="1" noRot="1" noChangeAspect="1"/>
+          </p:cNvSpPr>
+          <p:nvPr>
+            <p:ph type="sldImg"/>
+          </p:nvPr>
+        </p:nvSpPr>
+        <p:spPr/>
+      </p:sp>
+      <p:sp>
+        <p:nvSpPr>
+          <p:cNvPr id="3" name="Notes Placeholder 2"/>
+          <p:cNvSpPr>
+            <a:spLocks noGrp="1"/>
+          </p:cNvSpPr>
+          <p:nvPr>
+            <p:ph type="body" idx="1"/>
+          </p:nvPr>
+        </p:nvSpPr>
+        <p:spPr/>
+        <p:txBody>
+          <a:bodyPr/>
+          <a:lstStyle/>
+          <a:p>
+            <a:r>
+              <a:rPr lang="en-US" dirty="0" smtClean="0"/>
+              <a:t>Add confusion </a:t>
+            </a:r>
+            <a:r>
+              <a:rPr lang="en-US" dirty="0" smtClean="0"/>
+              <a:t>matrix?</a:t>
+            </a:r>
+          </a:p>
+          <a:p>
+            <a:r>
+              <a:rPr lang="en-US" dirty="0" smtClean="0"/>
+              <a:t>Dire di </a:t>
+            </a:r>
+            <a:r>
+              <a:rPr lang="en-US" dirty="0" err="1" smtClean="0"/>
+              <a:t>altri</a:t>
+            </a:r>
+            <a:r>
+              <a:rPr lang="en-US" dirty="0" smtClean="0"/>
+              <a:t> kernel? Se </a:t>
+            </a:r>
+            <a:r>
+              <a:rPr lang="en-US" dirty="0" err="1" smtClean="0"/>
+              <a:t>si</a:t>
+            </a:r>
+            <a:r>
+              <a:rPr lang="en-US" dirty="0" smtClean="0"/>
+              <a:t> </a:t>
+            </a:r>
+            <a:r>
+              <a:rPr lang="en-US" dirty="0" err="1" smtClean="0"/>
+              <a:t>quanto</a:t>
+            </a:r>
+            <a:r>
+              <a:rPr lang="en-US" dirty="0" smtClean="0"/>
+              <a:t>?</a:t>
+            </a:r>
+          </a:p>
+          <a:p>
+            <a:r>
+              <a:rPr lang="en-US" dirty="0" err="1" smtClean="0"/>
+              <a:t>Parametri</a:t>
+            </a:r>
+            <a:r>
+              <a:rPr lang="en-US" dirty="0" smtClean="0"/>
+              <a:t> SVM?</a:t>
+            </a:r>
+          </a:p>
+          <a:p>
+            <a:endParaRPr lang="en-US" dirty="0" smtClean="0"/>
+          </a:p>
+          <a:p>
+            <a:endParaRPr lang="en-US" dirty="0"/>
+          </a:p>
+        </p:txBody>
+      </p:sp>
+      <p:sp>
+        <p:nvSpPr>
+          <p:cNvPr id="4" name="Slide Number Placeholder 3"/>
+          <p:cNvSpPr>
+            <a:spLocks noGrp="1"/>
+          </p:cNvSpPr>
+          <p:nvPr>
+            <p:ph type="sldNum" sz="quarter" idx="10"/>
+          </p:nvPr>
+        </p:nvSpPr>
+        <p:spPr/>
+        <p:txBody>
+          <a:bodyPr/>
+          <a:lstStyle/>
+          <a:p>
+            <a:pPr>
+              <a:defRPr/>
+            </a:pPr>
+            <a:fld id="{0BD935CA-3C3B-47B5-B52B-F13E37D8C3A5}" type="slidenum">
+              <a:rPr lang="it-IT" altLang="it-IT" smtClean="0"/>
+              <a:pPr>
+                <a:defRPr/>
+              </a:pPr>
+              <a:t>24</a:t>
+            </a:fld>
+            <a:endParaRPr lang="it-IT" altLang="it-IT"/>
+          </a:p>
+        </p:txBody>
+      </p:sp>
+    </p:spTree>
+    <p:extLst>
+      <p:ext uri="{BB962C8B-B14F-4D97-AF65-F5344CB8AC3E}">
+        <p14:creationId xmlns:p14="http://schemas.microsoft.com/office/powerpoint/2010/main" val="1832073229"/>
+      </p:ext>
+    </p:extLst>
+  </p:cSld>
+  <p:clrMapOvr>
+    <a:masterClrMapping/>
+  </p:clrMapOvr>
+</p:notes>
+</file>
+
+<file path=ppt/notesSlides/notesSlide25.xml><?xml version="1.0" encoding="utf-8"?>
+<p:notes xmlns:a="http://schemas.openxmlformats.org/drawingml/2006/main" xmlns:r="http://schemas.openxmlformats.org/officeDocument/2006/relationships" xmlns:p="http://schemas.openxmlformats.org/presentationml/2006/main">
+  <p:cSld>
+    <p:spTree>
+      <p:nvGrpSpPr>
+        <p:cNvPr id="1" name=""/>
+        <p:cNvGrpSpPr/>
+        <p:nvPr/>
+      </p:nvGrpSpPr>
+      <p:grpSpPr>
+        <a:xfrm>
+          <a:off x="0" y="0"/>
+          <a:ext cx="0" cy="0"/>
+          <a:chOff x="0" y="0"/>
+          <a:chExt cx="0" cy="0"/>
+        </a:xfrm>
+      </p:grpSpPr>
+      <p:sp>
+        <p:nvSpPr>
+          <p:cNvPr id="2" name="Slide Image Placeholder 1"/>
+          <p:cNvSpPr>
+            <a:spLocks noGrp="1" noRot="1" noChangeAspect="1"/>
+          </p:cNvSpPr>
+          <p:nvPr>
+            <p:ph type="sldImg"/>
+          </p:nvPr>
+        </p:nvSpPr>
+        <p:spPr/>
+      </p:sp>
+      <p:sp>
+        <p:nvSpPr>
+          <p:cNvPr id="3" name="Notes Placeholder 2"/>
+          <p:cNvSpPr>
+            <a:spLocks noGrp="1"/>
+          </p:cNvSpPr>
+          <p:nvPr>
+            <p:ph type="body" idx="1"/>
+          </p:nvPr>
+        </p:nvSpPr>
+        <p:spPr/>
+        <p:txBody>
+          <a:bodyPr/>
+          <a:lstStyle/>
+          <a:p>
+            <a:endParaRPr lang="en-US" dirty="0"/>
+          </a:p>
+        </p:txBody>
+      </p:sp>
+      <p:sp>
+        <p:nvSpPr>
+          <p:cNvPr id="4" name="Slide Number Placeholder 3"/>
+          <p:cNvSpPr>
+            <a:spLocks noGrp="1"/>
+          </p:cNvSpPr>
+          <p:nvPr>
+            <p:ph type="sldNum" sz="quarter" idx="10"/>
+          </p:nvPr>
+        </p:nvSpPr>
+        <p:spPr/>
+        <p:txBody>
+          <a:bodyPr/>
+          <a:lstStyle/>
+          <a:p>
+            <a:pPr>
+              <a:defRPr/>
+            </a:pPr>
+            <a:fld id="{0BD935CA-3C3B-47B5-B52B-F13E37D8C3A5}" type="slidenum">
+              <a:rPr lang="it-IT" altLang="it-IT" smtClean="0"/>
+              <a:pPr>
+                <a:defRPr/>
+              </a:pPr>
+              <a:t>27</a:t>
             </a:fld>
             <a:endParaRPr lang="it-IT" altLang="it-IT"/>
           </a:p>
@@ -5739,7 +6065,7 @@
               <a:pPr>
                 <a:defRPr/>
               </a:pPr>
-              <a:t>06/01/2019</a:t>
+              <a:t>07/01/2019</a:t>
             </a:fld>
             <a:endParaRPr lang="it-IT" altLang="it-IT"/>
           </a:p>
@@ -5966,7 +6292,7 @@
               <a:pPr>
                 <a:defRPr/>
               </a:pPr>
-              <a:t>06/01/2019</a:t>
+              <a:t>07/01/2019</a:t>
             </a:fld>
             <a:endParaRPr lang="it-IT" altLang="it-IT"/>
           </a:p>
@@ -6203,7 +6529,7 @@
               <a:pPr>
                 <a:defRPr/>
               </a:pPr>
-              <a:t>06/01/2019</a:t>
+              <a:t>07/01/2019</a:t>
             </a:fld>
             <a:endParaRPr lang="it-IT" altLang="it-IT"/>
           </a:p>
@@ -6496,7 +6822,7 @@
               <a:pPr>
                 <a:defRPr/>
               </a:pPr>
-              <a:t>06/01/2019</a:t>
+              <a:t>07/01/2019</a:t>
             </a:fld>
             <a:endParaRPr lang="it-IT" altLang="it-IT"/>
           </a:p>
@@ -6702,7 +7028,7 @@
               <a:pPr>
                 <a:defRPr/>
               </a:pPr>
-              <a:t>06/01/2019</a:t>
+              <a:t>07/01/2019</a:t>
             </a:fld>
             <a:endParaRPr lang="it-IT" altLang="it-IT"/>
           </a:p>
@@ -6908,7 +7234,7 @@
               <a:pPr>
                 <a:defRPr/>
               </a:pPr>
-              <a:t>06/01/2019</a:t>
+              <a:t>07/01/2019</a:t>
             </a:fld>
             <a:endParaRPr lang="it-IT" altLang="it-IT"/>
           </a:p>
@@ -7135,7 +7461,7 @@
               <a:pPr>
                 <a:defRPr/>
               </a:pPr>
-              <a:t>06/01/2019</a:t>
+              <a:t>07/01/2019</a:t>
             </a:fld>
             <a:endParaRPr lang="it-IT" altLang="it-IT"/>
           </a:p>
@@ -7385,7 +7711,7 @@
               <a:pPr>
                 <a:defRPr/>
               </a:pPr>
-              <a:t>06/01/2019</a:t>
+              <a:t>07/01/2019</a:t>
             </a:fld>
             <a:endParaRPr lang="it-IT" altLang="it-IT"/>
           </a:p>
@@ -7673,7 +7999,7 @@
               <a:pPr>
                 <a:defRPr/>
               </a:pPr>
-              <a:t>06/01/2019</a:t>
+              <a:t>07/01/2019</a:t>
             </a:fld>
             <a:endParaRPr lang="it-IT" altLang="it-IT"/>
           </a:p>
@@ -8096,7 +8422,7 @@
               <a:pPr>
                 <a:defRPr/>
               </a:pPr>
-              <a:t>06/01/2019</a:t>
+              <a:t>07/01/2019</a:t>
             </a:fld>
             <a:endParaRPr lang="it-IT" altLang="it-IT"/>
           </a:p>
@@ -8272,7 +8598,7 @@
               <a:pPr>
                 <a:defRPr/>
               </a:pPr>
-              <a:t>06/01/2019</a:t>
+              <a:t>07/01/2019</a:t>
             </a:fld>
             <a:endParaRPr lang="it-IT" altLang="it-IT"/>
           </a:p>
@@ -8426,7 +8752,7 @@
               <a:pPr>
                 <a:defRPr/>
               </a:pPr>
-              <a:t>06/01/2019</a:t>
+              <a:t>07/01/2019</a:t>
             </a:fld>
             <a:endParaRPr lang="it-IT" altLang="it-IT"/>
           </a:p>
@@ -8760,7 +9086,7 @@
               <a:pPr>
                 <a:defRPr/>
               </a:pPr>
-              <a:t>06/01/2019</a:t>
+              <a:t>07/01/2019</a:t>
             </a:fld>
             <a:endParaRPr lang="it-IT" altLang="it-IT"/>
           </a:p>
@@ -9072,7 +9398,7 @@
               <a:pPr>
                 <a:defRPr/>
               </a:pPr>
-              <a:t>06/01/2019</a:t>
+              <a:t>07/01/2019</a:t>
             </a:fld>
             <a:endParaRPr lang="it-IT" altLang="it-IT"/>
           </a:p>
@@ -9744,7 +10070,7 @@
               <a:pPr>
                 <a:defRPr/>
               </a:pPr>
-              <a:t>06/01/2019</a:t>
+              <a:t>07/01/2019</a:t>
             </a:fld>
             <a:endParaRPr lang="it-IT" altLang="it-IT"/>
           </a:p>
@@ -10945,7 +11271,7 @@
               <a:pPr>
                 <a:defRPr/>
               </a:pPr>
-              <a:t>06/01/2019</a:t>
+              <a:t>07/01/2019</a:t>
             </a:fld>
             <a:endParaRPr lang="it-IT" altLang="it-IT"/>
           </a:p>
@@ -11186,7 +11512,7 @@
               <a:pPr>
                 <a:defRPr/>
               </a:pPr>
-              <a:t>06/01/2019</a:t>
+              <a:t>07/01/2019</a:t>
             </a:fld>
             <a:endParaRPr lang="it-IT" altLang="it-IT"/>
           </a:p>
@@ -11425,7 +11751,7 @@
               <a:pPr>
                 <a:defRPr/>
               </a:pPr>
-              <a:t>06/01/2019</a:t>
+              <a:t>07/01/2019</a:t>
             </a:fld>
             <a:endParaRPr lang="it-IT" altLang="it-IT" dirty="0"/>
           </a:p>
@@ -11674,7 +12000,7 @@
               <a:pPr>
                 <a:defRPr/>
               </a:pPr>
-              <a:t>06/01/2019</a:t>
+              <a:t>07/01/2019</a:t>
             </a:fld>
             <a:endParaRPr lang="it-IT" altLang="it-IT"/>
           </a:p>
@@ -11893,7 +12219,7 @@
               <a:pPr>
                 <a:defRPr/>
               </a:pPr>
-              <a:t>06/01/2019</a:t>
+              <a:t>07/01/2019</a:t>
             </a:fld>
             <a:endParaRPr lang="it-IT" altLang="it-IT"/>
           </a:p>
@@ -12086,7 +12412,7 @@
               <a:pPr>
                 <a:defRPr/>
               </a:pPr>
-              <a:t>06/01/2019</a:t>
+              <a:t>07/01/2019</a:t>
             </a:fld>
             <a:endParaRPr lang="it-IT" altLang="it-IT"/>
           </a:p>
@@ -12312,7 +12638,7 @@
               <a:pPr>
                 <a:defRPr/>
               </a:pPr>
-              <a:t>06/01/2019</a:t>
+              <a:t>07/01/2019</a:t>
             </a:fld>
             <a:endParaRPr lang="it-IT" altLang="it-IT"/>
           </a:p>
@@ -12506,11 +12832,7 @@
             <a:pPr lvl="1"/>
             <a:r>
               <a:rPr lang="en-US" dirty="0" smtClean="0"/>
-              <a:t>61 deceptive, 60 truthful</a:t>
-            </a:r>
-            <a:r>
-              <a:rPr lang="en-US" dirty="0" smtClean="0"/>
-              <a:t>.</a:t>
+              <a:t>61 deceptive, 60 truthful.</a:t>
             </a:r>
           </a:p>
           <a:p>
@@ -12524,7 +12846,6 @@
               <a:rPr lang="en-US" dirty="0" smtClean="0"/>
               <a:t>Cut/Remove so that subject’s face is visible.</a:t>
             </a:r>
-            <a:endParaRPr lang="en-US" dirty="0" smtClean="0"/>
           </a:p>
           <a:p>
             <a:r>
@@ -12539,17 +12860,8 @@
           <a:p>
             <a:r>
               <a:rPr lang="en-US" dirty="0" smtClean="0"/>
-              <a:t>Testimony </a:t>
-            </a:r>
-            <a:r>
-              <a:rPr lang="en-US" dirty="0" smtClean="0"/>
-              <a:t>were verified by police officers</a:t>
-            </a:r>
-            <a:r>
-              <a:rPr lang="en-US" dirty="0" smtClean="0"/>
-              <a:t>.</a:t>
-            </a:r>
-            <a:endParaRPr lang="en-US" dirty="0" smtClean="0"/>
+              <a:t>Testimony were verified by police officers.</a:t>
+            </a:r>
           </a:p>
         </p:txBody>
       </p:sp>
@@ -12576,7 +12888,7 @@
               <a:pPr>
                 <a:defRPr/>
               </a:pPr>
-              <a:t>06/01/2019</a:t>
+              <a:t>07/01/2019</a:t>
             </a:fld>
             <a:endParaRPr lang="it-IT" altLang="it-IT"/>
           </a:p>
@@ -12697,7 +13009,6 @@
               <a:rPr lang="en-US" dirty="0"/>
               <a:t>Training Dataset</a:t>
             </a:r>
-            <a:endParaRPr lang="en-US" dirty="0"/>
           </a:p>
         </p:txBody>
       </p:sp>
@@ -12817,7 +13128,7 @@
               <a:pPr>
                 <a:defRPr/>
               </a:pPr>
-              <a:t>06/01/2019</a:t>
+              <a:t>07/01/2019</a:t>
             </a:fld>
             <a:endParaRPr lang="it-IT" altLang="it-IT"/>
           </a:p>
@@ -13043,7 +13354,7 @@
               <a:pPr>
                 <a:defRPr/>
               </a:pPr>
-              <a:t>06/01/2019</a:t>
+              <a:t>07/01/2019</a:t>
             </a:fld>
             <a:endParaRPr lang="it-IT" altLang="it-IT"/>
           </a:p>
@@ -13280,7 +13591,7 @@
               <a:pPr>
                 <a:defRPr/>
               </a:pPr>
-              <a:t>06/01/2019</a:t>
+              <a:t>07/01/2019</a:t>
             </a:fld>
             <a:endParaRPr lang="it-IT" altLang="it-IT" dirty="0"/>
           </a:p>
@@ -13505,7 +13816,7 @@
               <a:pPr>
                 <a:defRPr/>
               </a:pPr>
-              <a:t>06/01/2019</a:t>
+              <a:t>07/01/2019</a:t>
             </a:fld>
             <a:endParaRPr lang="it-IT" altLang="it-IT"/>
           </a:p>
@@ -13593,7 +13904,7 @@
         <p:spPr>
           <a:xfrm>
             <a:off x="3131840" y="2564904"/>
-            <a:ext cx="5170517" cy="3190948"/>
+            <a:ext cx="5250583" cy="3240360"/>
           </a:xfrm>
           <a:prstGeom prst="rect">
             <a:avLst/>
@@ -13681,10 +13992,82 @@
           <a:p>
             <a:r>
               <a:rPr lang="en-US" dirty="0"/>
-              <a:t>Variable Importance using Random Forests</a:t>
-            </a:r>
-          </a:p>
-          <a:p>
+              <a:t>Frequency </a:t>
+            </a:r>
+            <a:r>
+              <a:rPr lang="en-US" dirty="0" smtClean="0"/>
+              <a:t>analysis </a:t>
+            </a:r>
+            <a:r>
+              <a:rPr lang="en-US" dirty="0"/>
+              <a:t>of AU occurrences in the </a:t>
+            </a:r>
+            <a:r>
+              <a:rPr lang="en-US" dirty="0" smtClean="0"/>
+              <a:t>test </a:t>
+            </a:r>
+            <a:r>
+              <a:rPr lang="en-US" dirty="0" smtClean="0"/>
+              <a:t>set.</a:t>
+            </a:r>
+            <a:endParaRPr lang="en-US" dirty="0"/>
+          </a:p>
+          <a:p>
+            <a:r>
+              <a:rPr lang="en-US" dirty="0"/>
+              <a:t>Significant differences for truthful and deceptive in:</a:t>
+            </a:r>
+          </a:p>
+          <a:p>
+            <a:pPr lvl="1"/>
+            <a:r>
+              <a:rPr lang="en-US" dirty="0" smtClean="0"/>
+              <a:t>AU</a:t>
+            </a:r>
+          </a:p>
+          <a:p>
+            <a:pPr lvl="1"/>
+            <a:r>
+              <a:rPr lang="en-US" dirty="0" smtClean="0"/>
+              <a:t>AU</a:t>
+            </a:r>
+          </a:p>
+          <a:p>
+            <a:pPr lvl="1"/>
+            <a:r>
+              <a:rPr lang="en-US" dirty="0" smtClean="0"/>
+              <a:t>AU</a:t>
+            </a:r>
+          </a:p>
+          <a:p>
+            <a:pPr lvl="1"/>
+            <a:r>
+              <a:rPr lang="en-US" dirty="0" smtClean="0"/>
+              <a:t>AU</a:t>
+            </a:r>
+          </a:p>
+          <a:p>
+            <a:pPr lvl="1"/>
+            <a:r>
+              <a:rPr lang="en-US" dirty="0" smtClean="0"/>
+              <a:t>AU</a:t>
+            </a:r>
+            <a:endParaRPr lang="en-US" dirty="0"/>
+          </a:p>
+          <a:p>
+            <a:pPr lvl="1"/>
+            <a:endParaRPr lang="en-US" dirty="0"/>
+          </a:p>
+          <a:p>
+            <a:pPr lvl="1"/>
+            <a:endParaRPr lang="en-US" dirty="0"/>
+          </a:p>
+          <a:p>
+            <a:pPr lvl="1"/>
+            <a:endParaRPr lang="en-US" dirty="0"/>
+          </a:p>
+          <a:p>
+            <a:pPr lvl="1"/>
             <a:endParaRPr lang="en-US" dirty="0"/>
           </a:p>
         </p:txBody>
@@ -13712,7 +14095,7 @@
               <a:pPr>
                 <a:defRPr/>
               </a:pPr>
-              <a:t>06/01/2019</a:t>
+              <a:t>07/01/2019</a:t>
             </a:fld>
             <a:endParaRPr lang="it-IT" altLang="it-IT"/>
           </a:p>
@@ -13772,6 +14155,439 @@
                 <a:defRPr/>
               </a:pPr>
               <a:t>21</a:t>
+            </a:fld>
+            <a:endParaRPr lang="it-IT" altLang="it-IT"/>
+          </a:p>
+        </p:txBody>
+      </p:sp>
+      <p:pic>
+        <p:nvPicPr>
+          <p:cNvPr id="8" name="Picture 7"/>
+          <p:cNvPicPr>
+            <a:picLocks noChangeAspect="1"/>
+          </p:cNvPicPr>
+          <p:nvPr/>
+        </p:nvPicPr>
+        <p:blipFill>
+          <a:blip r:embed="rId3"/>
+          <a:stretch>
+            <a:fillRect/>
+          </a:stretch>
+        </p:blipFill>
+        <p:spPr>
+          <a:xfrm>
+            <a:off x="3143666" y="2615588"/>
+            <a:ext cx="5172750" cy="3192326"/>
+          </a:xfrm>
+          <a:prstGeom prst="rect">
+            <a:avLst/>
+          </a:prstGeom>
+        </p:spPr>
+      </p:pic>
+    </p:spTree>
+    <p:extLst>
+      <p:ext uri="{BB962C8B-B14F-4D97-AF65-F5344CB8AC3E}">
+        <p14:creationId xmlns:p14="http://schemas.microsoft.com/office/powerpoint/2010/main" val="639135071"/>
+      </p:ext>
+    </p:extLst>
+  </p:cSld>
+  <p:clrMapOvr>
+    <a:masterClrMapping/>
+  </p:clrMapOvr>
+  <p:timing>
+    <p:tnLst>
+      <p:par>
+        <p:cTn id="1" dur="indefinite" restart="never" nodeType="tmRoot"/>
+      </p:par>
+    </p:tnLst>
+  </p:timing>
+</p:sld>
+</file>
+
+<file path=ppt/slides/slide22.xml><?xml version="1.0" encoding="utf-8"?>
+<p:sld xmlns:a="http://schemas.openxmlformats.org/drawingml/2006/main" xmlns:r="http://schemas.openxmlformats.org/officeDocument/2006/relationships" xmlns:p="http://schemas.openxmlformats.org/presentationml/2006/main">
+  <p:cSld>
+    <p:spTree>
+      <p:nvGrpSpPr>
+        <p:cNvPr id="1" name=""/>
+        <p:cNvGrpSpPr/>
+        <p:nvPr/>
+      </p:nvGrpSpPr>
+      <p:grpSpPr>
+        <a:xfrm>
+          <a:off x="0" y="0"/>
+          <a:ext cx="0" cy="0"/>
+          <a:chOff x="0" y="0"/>
+          <a:chExt cx="0" cy="0"/>
+        </a:xfrm>
+      </p:grpSpPr>
+      <p:sp>
+        <p:nvSpPr>
+          <p:cNvPr id="2" name="Title 1"/>
+          <p:cNvSpPr>
+            <a:spLocks noGrp="1"/>
+          </p:cNvSpPr>
+          <p:nvPr>
+            <p:ph type="title"/>
+          </p:nvPr>
+        </p:nvSpPr>
+        <p:spPr/>
+        <p:txBody>
+          <a:bodyPr/>
+          <a:lstStyle/>
+          <a:p>
+            <a:r>
+              <a:rPr lang="en-US" dirty="0"/>
+              <a:t>Deception Detection</a:t>
+            </a:r>
+          </a:p>
+        </p:txBody>
+      </p:sp>
+      <p:sp>
+        <p:nvSpPr>
+          <p:cNvPr id="3" name="Content Placeholder 2"/>
+          <p:cNvSpPr>
+            <a:spLocks noGrp="1"/>
+          </p:cNvSpPr>
+          <p:nvPr>
+            <p:ph idx="1"/>
+          </p:nvPr>
+        </p:nvSpPr>
+        <p:spPr>
+          <a:xfrm>
+            <a:off x="1116013" y="1203672"/>
+            <a:ext cx="7559675" cy="4385568"/>
+          </a:xfrm>
+        </p:spPr>
+        <p:txBody>
+          <a:bodyPr/>
+          <a:lstStyle/>
+          <a:p>
+            <a:r>
+              <a:rPr lang="en-US" dirty="0"/>
+              <a:t>Frequency </a:t>
+            </a:r>
+            <a:r>
+              <a:rPr lang="en-US" dirty="0" smtClean="0"/>
+              <a:t>analysis </a:t>
+            </a:r>
+            <a:r>
+              <a:rPr lang="en-US" dirty="0"/>
+              <a:t>of AU occurrences in the </a:t>
+            </a:r>
+            <a:r>
+              <a:rPr lang="en-US" dirty="0" smtClean="0"/>
+              <a:t>test </a:t>
+            </a:r>
+            <a:r>
+              <a:rPr lang="en-US" dirty="0" smtClean="0"/>
+              <a:t>set.</a:t>
+            </a:r>
+            <a:endParaRPr lang="en-US" dirty="0"/>
+          </a:p>
+          <a:p>
+            <a:r>
+              <a:rPr lang="en-US" dirty="0"/>
+              <a:t>Significant differences for truthful and deceptive in:</a:t>
+            </a:r>
+          </a:p>
+          <a:p>
+            <a:pPr lvl="1"/>
+            <a:r>
+              <a:rPr lang="en-US" dirty="0"/>
+              <a:t>AU04</a:t>
+            </a:r>
+          </a:p>
+          <a:p>
+            <a:pPr lvl="1"/>
+            <a:r>
+              <a:rPr lang="en-US" dirty="0"/>
+              <a:t>AU05</a:t>
+            </a:r>
+          </a:p>
+          <a:p>
+            <a:pPr lvl="1"/>
+            <a:r>
+              <a:rPr lang="en-US" dirty="0"/>
+              <a:t>AU07</a:t>
+            </a:r>
+          </a:p>
+          <a:p>
+            <a:pPr lvl="1"/>
+            <a:r>
+              <a:rPr lang="en-US" dirty="0"/>
+              <a:t>AU12</a:t>
+            </a:r>
+          </a:p>
+          <a:p>
+            <a:pPr lvl="1"/>
+            <a:r>
+              <a:rPr lang="en-US" dirty="0"/>
+              <a:t>AU14</a:t>
+            </a:r>
+          </a:p>
+        </p:txBody>
+      </p:sp>
+      <p:sp>
+        <p:nvSpPr>
+          <p:cNvPr id="4" name="Date Placeholder 3"/>
+          <p:cNvSpPr>
+            <a:spLocks noGrp="1"/>
+          </p:cNvSpPr>
+          <p:nvPr>
+            <p:ph type="dt" sz="half" idx="10"/>
+          </p:nvPr>
+        </p:nvSpPr>
+        <p:spPr/>
+        <p:txBody>
+          <a:bodyPr/>
+          <a:lstStyle/>
+          <a:p>
+            <a:pPr>
+              <a:defRPr/>
+            </a:pPr>
+            <a:fld id="{B730D388-5B29-4126-AC54-A0FD22452F77}" type="datetime1">
+              <a:rPr lang="it-IT" altLang="it-IT" smtClean="0"/>
+              <a:pPr>
+                <a:defRPr/>
+              </a:pPr>
+              <a:t>07/01/2019</a:t>
+            </a:fld>
+            <a:endParaRPr lang="it-IT" altLang="it-IT"/>
+          </a:p>
+        </p:txBody>
+      </p:sp>
+      <p:sp>
+        <p:nvSpPr>
+          <p:cNvPr id="5" name="Footer Placeholder 4"/>
+          <p:cNvSpPr>
+            <a:spLocks noGrp="1"/>
+          </p:cNvSpPr>
+          <p:nvPr>
+            <p:ph type="ftr" sz="quarter" idx="11"/>
+          </p:nvPr>
+        </p:nvSpPr>
+        <p:spPr/>
+        <p:txBody>
+          <a:bodyPr/>
+          <a:lstStyle/>
+          <a:p>
+            <a:pPr>
+              <a:defRPr/>
+            </a:pPr>
+            <a:r>
+              <a:rPr lang="en-US" altLang="it-IT" dirty="0" smtClean="0"/>
+              <a:t>Deception Detection using Facial Action Units</a:t>
+            </a:r>
+            <a:endParaRPr lang="it-IT" altLang="it-IT" dirty="0"/>
+          </a:p>
+        </p:txBody>
+      </p:sp>
+      <p:sp>
+        <p:nvSpPr>
+          <p:cNvPr id="6" name="Slide Number Placeholder 5"/>
+          <p:cNvSpPr>
+            <a:spLocks noGrp="1"/>
+          </p:cNvSpPr>
+          <p:nvPr>
+            <p:ph type="sldNum" sz="quarter" idx="12"/>
+          </p:nvPr>
+        </p:nvSpPr>
+        <p:spPr/>
+        <p:txBody>
+          <a:bodyPr/>
+          <a:lstStyle/>
+          <a:p>
+            <a:pPr>
+              <a:defRPr/>
+            </a:pPr>
+            <a:r>
+              <a:rPr lang="it-IT" altLang="it-IT" smtClean="0"/>
+              <a:t>Pagina </a:t>
+            </a:r>
+            <a:fld id="{A5888ACF-FC31-4A35-9932-E1138572A9AA}" type="slidenum">
+              <a:rPr lang="it-IT" altLang="it-IT" smtClean="0"/>
+              <a:pPr>
+                <a:defRPr/>
+              </a:pPr>
+              <a:t>22</a:t>
+            </a:fld>
+            <a:endParaRPr lang="it-IT" altLang="it-IT"/>
+          </a:p>
+        </p:txBody>
+      </p:sp>
+    </p:spTree>
+    <p:extLst>
+      <p:ext uri="{BB962C8B-B14F-4D97-AF65-F5344CB8AC3E}">
+        <p14:creationId xmlns:p14="http://schemas.microsoft.com/office/powerpoint/2010/main" val="2885195566"/>
+      </p:ext>
+    </p:extLst>
+  </p:cSld>
+  <p:clrMapOvr>
+    <a:masterClrMapping/>
+  </p:clrMapOvr>
+  <p:timing>
+    <p:tnLst>
+      <p:par>
+        <p:cTn id="1" dur="indefinite" restart="never" nodeType="tmRoot"/>
+      </p:par>
+    </p:tnLst>
+  </p:timing>
+</p:sld>
+</file>
+
+<file path=ppt/slides/slide23.xml><?xml version="1.0" encoding="utf-8"?>
+<p:sld xmlns:a="http://schemas.openxmlformats.org/drawingml/2006/main" xmlns:r="http://schemas.openxmlformats.org/officeDocument/2006/relationships" xmlns:p="http://schemas.openxmlformats.org/presentationml/2006/main">
+  <p:cSld>
+    <p:spTree>
+      <p:nvGrpSpPr>
+        <p:cNvPr id="1" name=""/>
+        <p:cNvGrpSpPr/>
+        <p:nvPr/>
+      </p:nvGrpSpPr>
+      <p:grpSpPr>
+        <a:xfrm>
+          <a:off x="0" y="0"/>
+          <a:ext cx="0" cy="0"/>
+          <a:chOff x="0" y="0"/>
+          <a:chExt cx="0" cy="0"/>
+        </a:xfrm>
+      </p:grpSpPr>
+      <p:sp>
+        <p:nvSpPr>
+          <p:cNvPr id="2" name="Title 1"/>
+          <p:cNvSpPr>
+            <a:spLocks noGrp="1"/>
+          </p:cNvSpPr>
+          <p:nvPr>
+            <p:ph type="title"/>
+          </p:nvPr>
+        </p:nvSpPr>
+        <p:spPr/>
+        <p:txBody>
+          <a:bodyPr/>
+          <a:lstStyle/>
+          <a:p>
+            <a:r>
+              <a:rPr lang="en-US" dirty="0"/>
+              <a:t>Deception Detection</a:t>
+            </a:r>
+          </a:p>
+        </p:txBody>
+      </p:sp>
+      <p:sp>
+        <p:nvSpPr>
+          <p:cNvPr id="3" name="Content Placeholder 2"/>
+          <p:cNvSpPr>
+            <a:spLocks noGrp="1"/>
+          </p:cNvSpPr>
+          <p:nvPr>
+            <p:ph idx="1"/>
+          </p:nvPr>
+        </p:nvSpPr>
+        <p:spPr>
+          <a:xfrm>
+            <a:off x="1116013" y="1203672"/>
+            <a:ext cx="7559675" cy="4385568"/>
+          </a:xfrm>
+        </p:spPr>
+        <p:txBody>
+          <a:bodyPr/>
+          <a:lstStyle/>
+          <a:p>
+            <a:r>
+              <a:rPr lang="en-US" dirty="0"/>
+              <a:t>Variable Importance using Random Forests</a:t>
+            </a:r>
+          </a:p>
+          <a:p>
+            <a:endParaRPr lang="en-US" dirty="0"/>
+          </a:p>
+        </p:txBody>
+      </p:sp>
+      <p:sp>
+        <p:nvSpPr>
+          <p:cNvPr id="4" name="Date Placeholder 3"/>
+          <p:cNvSpPr>
+            <a:spLocks noGrp="1"/>
+          </p:cNvSpPr>
+          <p:nvPr>
+            <p:ph type="dt" sz="half" idx="10"/>
+          </p:nvPr>
+        </p:nvSpPr>
+        <p:spPr/>
+        <p:txBody>
+          <a:bodyPr/>
+          <a:lstStyle/>
+          <a:p>
+            <a:pPr>
+              <a:defRPr/>
+            </a:pPr>
+            <a:fld id="{B730D388-5B29-4126-AC54-A0FD22452F77}" type="datetime1">
+              <a:rPr lang="it-IT" altLang="it-IT" smtClean="0"/>
+              <a:pPr>
+                <a:defRPr/>
+              </a:pPr>
+              <a:t>07/01/2019</a:t>
+            </a:fld>
+            <a:endParaRPr lang="it-IT" altLang="it-IT"/>
+          </a:p>
+        </p:txBody>
+      </p:sp>
+      <p:sp>
+        <p:nvSpPr>
+          <p:cNvPr id="5" name="Footer Placeholder 4"/>
+          <p:cNvSpPr>
+            <a:spLocks noGrp="1"/>
+          </p:cNvSpPr>
+          <p:nvPr>
+            <p:ph type="ftr" sz="quarter" idx="11"/>
+          </p:nvPr>
+        </p:nvSpPr>
+        <p:spPr/>
+        <p:txBody>
+          <a:bodyPr/>
+          <a:lstStyle/>
+          <a:p>
+            <a:pPr>
+              <a:defRPr/>
+            </a:pPr>
+            <a:r>
+              <a:rPr lang="en-US" altLang="it-IT" dirty="0" smtClean="0"/>
+              <a:t>Deception Detection using Facial Action Units</a:t>
+            </a:r>
+            <a:endParaRPr lang="it-IT" altLang="it-IT" dirty="0"/>
+          </a:p>
+        </p:txBody>
+      </p:sp>
+      <p:sp>
+        <p:nvSpPr>
+          <p:cNvPr id="6" name="Slide Number Placeholder 5"/>
+          <p:cNvSpPr>
+            <a:spLocks noGrp="1"/>
+          </p:cNvSpPr>
+          <p:nvPr>
+            <p:ph type="sldNum" sz="quarter" idx="12"/>
+          </p:nvPr>
+        </p:nvSpPr>
+        <p:spPr/>
+        <p:txBody>
+          <a:bodyPr/>
+          <a:lstStyle/>
+          <a:p>
+            <a:pPr>
+              <a:defRPr/>
+            </a:pPr>
+            <a:r>
+              <a:rPr lang="it-IT" altLang="it-IT" smtClean="0"/>
+              <a:t>Pagina </a:t>
+            </a:r>
+            <a:fld id="{A5888ACF-FC31-4A35-9932-E1138572A9AA}" type="slidenum">
+              <a:rPr lang="it-IT" altLang="it-IT" smtClean="0"/>
+              <a:pPr>
+                <a:defRPr/>
+              </a:pPr>
+              <a:t>23</a:t>
             </a:fld>
             <a:endParaRPr lang="it-IT" altLang="it-IT"/>
           </a:p>
@@ -13827,7 +14643,7 @@
 </p:sld>
 </file>
 
-<file path=ppt/slides/slide22.xml><?xml version="1.0" encoding="utf-8"?>
+<file path=ppt/slides/slide24.xml><?xml version="1.0" encoding="utf-8"?>
 <p:sld xmlns:a="http://schemas.openxmlformats.org/drawingml/2006/main" xmlns:r="http://schemas.openxmlformats.org/officeDocument/2006/relationships" xmlns:p="http://schemas.openxmlformats.org/presentationml/2006/main">
   <p:cSld>
     <p:spTree>
@@ -13930,7 +14746,7 @@
               <a:pPr>
                 <a:defRPr/>
               </a:pPr>
-              <a:t>06/01/2019</a:t>
+              <a:t>07/01/2019</a:t>
             </a:fld>
             <a:endParaRPr lang="it-IT" altLang="it-IT"/>
           </a:p>
@@ -13989,7 +14805,7 @@
               <a:pPr>
                 <a:defRPr/>
               </a:pPr>
-              <a:t>22</a:t>
+              <a:t>24</a:t>
             </a:fld>
             <a:endParaRPr lang="it-IT" altLang="it-IT"/>
           </a:p>
@@ -14039,7 +14855,7 @@
 </p:sld>
 </file>
 
-<file path=ppt/slides/slide23.xml><?xml version="1.0" encoding="utf-8"?>
+<file path=ppt/slides/slide25.xml><?xml version="1.0" encoding="utf-8"?>
 <p:sld xmlns:a="http://schemas.openxmlformats.org/drawingml/2006/main" xmlns:r="http://schemas.openxmlformats.org/officeDocument/2006/relationships" xmlns:p="http://schemas.openxmlformats.org/presentationml/2006/main">
   <p:cSld>
     <p:spTree>
@@ -14150,11 +14966,7 @@
           <a:p>
             <a:r>
               <a:rPr lang="en-US" dirty="0" smtClean="0"/>
-              <a:t>Implement heuristics based on psychological </a:t>
-            </a:r>
-            <a:r>
-              <a:rPr lang="en-US" dirty="0" smtClean="0"/>
-              <a:t>studies.</a:t>
+              <a:t>Implement heuristics based on psychological studies.</a:t>
             </a:r>
             <a:endParaRPr lang="en-US" dirty="0"/>
           </a:p>
@@ -14183,7 +14995,7 @@
               <a:pPr>
                 <a:defRPr/>
               </a:pPr>
-              <a:t>06/01/2019</a:t>
+              <a:t>07/01/2019</a:t>
             </a:fld>
             <a:endParaRPr lang="it-IT" altLang="it-IT"/>
           </a:p>
@@ -14242,7 +15054,7 @@
               <a:pPr>
                 <a:defRPr/>
               </a:pPr>
-              <a:t>23</a:t>
+              <a:t>25</a:t>
             </a:fld>
             <a:endParaRPr lang="it-IT" altLang="it-IT"/>
           </a:p>
@@ -14268,7 +15080,7 @@
 </p:sld>
 </file>
 
-<file path=ppt/slides/slide24.xml><?xml version="1.0" encoding="utf-8"?>
+<file path=ppt/slides/slide26.xml><?xml version="1.0" encoding="utf-8"?>
 <p:sld xmlns:a="http://schemas.openxmlformats.org/drawingml/2006/main" xmlns:r="http://schemas.openxmlformats.org/officeDocument/2006/relationships" xmlns:p="http://schemas.openxmlformats.org/presentationml/2006/main">
   <p:cSld>
     <p:spTree>
@@ -14308,7 +15120,7 @@
               <a:pPr>
                 <a:defRPr/>
               </a:pPr>
-              <a:t>06/01/2019</a:t>
+              <a:t>07/01/2019</a:t>
             </a:fld>
             <a:endParaRPr lang="it-IT" altLang="it-IT"/>
           </a:p>
@@ -14367,7 +15179,7 @@
               <a:pPr>
                 <a:defRPr/>
               </a:pPr>
-              <a:t>24</a:t>
+              <a:t>26</a:t>
             </a:fld>
             <a:endParaRPr lang="it-IT" altLang="it-IT"/>
           </a:p>
@@ -14587,7 +15399,7 @@
 </p:sld>
 </file>
 
-<file path=ppt/slides/slide25.xml><?xml version="1.0" encoding="utf-8"?>
+<file path=ppt/slides/slide27.xml><?xml version="1.0" encoding="utf-8"?>
 <p:sld xmlns:a="http://schemas.openxmlformats.org/drawingml/2006/main" xmlns:r="http://schemas.openxmlformats.org/officeDocument/2006/relationships" xmlns:p="http://schemas.openxmlformats.org/presentationml/2006/main">
   <p:cSld>
     <p:spTree>
@@ -14651,7 +15463,7 @@
               <a:pPr>
                 <a:defRPr/>
               </a:pPr>
-              <a:t>06/01/2019</a:t>
+              <a:t>07/01/2019</a:t>
             </a:fld>
             <a:endParaRPr lang="it-IT" altLang="it-IT"/>
           </a:p>
@@ -14710,7 +15522,7 @@
               <a:pPr>
                 <a:defRPr/>
               </a:pPr>
-              <a:t>25</a:t>
+              <a:t>27</a:t>
             </a:fld>
             <a:endParaRPr lang="it-IT" altLang="it-IT"/>
           </a:p>
@@ -14879,7 +15691,7 @@
               <a:pPr>
                 <a:defRPr/>
               </a:pPr>
-              <a:t>06/01/2019</a:t>
+              <a:t>07/01/2019</a:t>
             </a:fld>
             <a:endParaRPr lang="it-IT" altLang="it-IT"/>
           </a:p>
@@ -15105,7 +15917,7 @@
               <a:pPr>
                 <a:defRPr/>
               </a:pPr>
-              <a:t>06/01/2019</a:t>
+              <a:t>07/01/2019</a:t>
             </a:fld>
             <a:endParaRPr lang="it-IT" altLang="it-IT"/>
           </a:p>
@@ -15369,7 +16181,7 @@
               <a:pPr>
                 <a:defRPr/>
               </a:pPr>
-              <a:t>06/01/2019</a:t>
+              <a:t>07/01/2019</a:t>
             </a:fld>
             <a:endParaRPr lang="it-IT" altLang="it-IT"/>
           </a:p>
@@ -15581,7 +16393,7 @@
               <a:pPr>
                 <a:defRPr/>
               </a:pPr>
-              <a:t>06/01/2019</a:t>
+              <a:t>07/01/2019</a:t>
             </a:fld>
             <a:endParaRPr lang="it-IT" altLang="it-IT"/>
           </a:p>
@@ -15795,7 +16607,7 @@
               <a:pPr>
                 <a:defRPr/>
               </a:pPr>
-              <a:t>06/01/2019</a:t>
+              <a:t>07/01/2019</a:t>
             </a:fld>
             <a:endParaRPr lang="it-IT" altLang="it-IT"/>
           </a:p>
@@ -16068,7 +16880,7 @@
               <a:pPr>
                 <a:defRPr/>
               </a:pPr>
-              <a:t>06/01/2019</a:t>
+              <a:t>07/01/2019</a:t>
             </a:fld>
             <a:endParaRPr lang="it-IT" altLang="it-IT"/>
           </a:p>
@@ -16313,7 +17125,7 @@
               <a:pPr>
                 <a:defRPr/>
               </a:pPr>
-              <a:t>06/01/2019</a:t>
+              <a:t>07/01/2019</a:t>
             </a:fld>
             <a:endParaRPr lang="it-IT" altLang="it-IT"/>
           </a:p>

</xml_diff>